<commit_message>
moedling/structure/CD/advanced: fixed typo in Player-Bot question
</commit_message>
<xml_diff>
--- a/diagrams/modelling/modellingStructures/classDiagramsAdvanced/playerBot.pptx
+++ b/diagrams/modelling/modellingStructures/classDiagramsAdvanced/playerBot.pptx
@@ -306,7 +306,7 @@
           <a:p>
             <a:fld id="{A0F86979-30DA-49EE-A740-32EBA6D2B7DE}" type="datetimeFigureOut">
               <a:rPr lang="en-SG" smtClean="0"/>
-              <a:t>17/10/2017</a:t>
+              <a:t>18/10/2017</a:t>
             </a:fld>
             <a:endParaRPr lang="en-SG"/>
           </a:p>
@@ -476,7 +476,7 @@
           <a:p>
             <a:fld id="{A0F86979-30DA-49EE-A740-32EBA6D2B7DE}" type="datetimeFigureOut">
               <a:rPr lang="en-SG" smtClean="0"/>
-              <a:t>17/10/2017</a:t>
+              <a:t>18/10/2017</a:t>
             </a:fld>
             <a:endParaRPr lang="en-SG"/>
           </a:p>
@@ -656,7 +656,7 @@
           <a:p>
             <a:fld id="{A0F86979-30DA-49EE-A740-32EBA6D2B7DE}" type="datetimeFigureOut">
               <a:rPr lang="en-SG" smtClean="0"/>
-              <a:t>17/10/2017</a:t>
+              <a:t>18/10/2017</a:t>
             </a:fld>
             <a:endParaRPr lang="en-SG"/>
           </a:p>
@@ -826,7 +826,7 @@
           <a:p>
             <a:fld id="{A0F86979-30DA-49EE-A740-32EBA6D2B7DE}" type="datetimeFigureOut">
               <a:rPr lang="en-SG" smtClean="0"/>
-              <a:t>17/10/2017</a:t>
+              <a:t>18/10/2017</a:t>
             </a:fld>
             <a:endParaRPr lang="en-SG"/>
           </a:p>
@@ -1072,7 +1072,7 @@
           <a:p>
             <a:fld id="{A0F86979-30DA-49EE-A740-32EBA6D2B7DE}" type="datetimeFigureOut">
               <a:rPr lang="en-SG" smtClean="0"/>
-              <a:t>17/10/2017</a:t>
+              <a:t>18/10/2017</a:t>
             </a:fld>
             <a:endParaRPr lang="en-SG"/>
           </a:p>
@@ -1360,7 +1360,7 @@
           <a:p>
             <a:fld id="{A0F86979-30DA-49EE-A740-32EBA6D2B7DE}" type="datetimeFigureOut">
               <a:rPr lang="en-SG" smtClean="0"/>
-              <a:t>17/10/2017</a:t>
+              <a:t>18/10/2017</a:t>
             </a:fld>
             <a:endParaRPr lang="en-SG"/>
           </a:p>
@@ -1782,7 +1782,7 @@
           <a:p>
             <a:fld id="{A0F86979-30DA-49EE-A740-32EBA6D2B7DE}" type="datetimeFigureOut">
               <a:rPr lang="en-SG" smtClean="0"/>
-              <a:t>17/10/2017</a:t>
+              <a:t>18/10/2017</a:t>
             </a:fld>
             <a:endParaRPr lang="en-SG"/>
           </a:p>
@@ -1900,7 +1900,7 @@
           <a:p>
             <a:fld id="{A0F86979-30DA-49EE-A740-32EBA6D2B7DE}" type="datetimeFigureOut">
               <a:rPr lang="en-SG" smtClean="0"/>
-              <a:t>17/10/2017</a:t>
+              <a:t>18/10/2017</a:t>
             </a:fld>
             <a:endParaRPr lang="en-SG"/>
           </a:p>
@@ -1995,7 +1995,7 @@
           <a:p>
             <a:fld id="{A0F86979-30DA-49EE-A740-32EBA6D2B7DE}" type="datetimeFigureOut">
               <a:rPr lang="en-SG" smtClean="0"/>
-              <a:t>17/10/2017</a:t>
+              <a:t>18/10/2017</a:t>
             </a:fld>
             <a:endParaRPr lang="en-SG"/>
           </a:p>
@@ -2272,7 +2272,7 @@
           <a:p>
             <a:fld id="{A0F86979-30DA-49EE-A740-32EBA6D2B7DE}" type="datetimeFigureOut">
               <a:rPr lang="en-SG" smtClean="0"/>
-              <a:t>17/10/2017</a:t>
+              <a:t>18/10/2017</a:t>
             </a:fld>
             <a:endParaRPr lang="en-SG"/>
           </a:p>
@@ -2525,7 +2525,7 @@
           <a:p>
             <a:fld id="{A0F86979-30DA-49EE-A740-32EBA6D2B7DE}" type="datetimeFigureOut">
               <a:rPr lang="en-SG" smtClean="0"/>
-              <a:t>17/10/2017</a:t>
+              <a:t>18/10/2017</a:t>
             </a:fld>
             <a:endParaRPr lang="en-SG"/>
           </a:p>
@@ -2738,7 +2738,7 @@
           <a:p>
             <a:fld id="{A0F86979-30DA-49EE-A740-32EBA6D2B7DE}" type="datetimeFigureOut">
               <a:rPr lang="en-SG" smtClean="0"/>
-              <a:t>17/10/2017</a:t>
+              <a:t>18/10/2017</a:t>
             </a:fld>
             <a:endParaRPr lang="en-SG"/>
           </a:p>
@@ -3173,8 +3173,27 @@
                 </a:solidFill>
                 <a:latin typeface="Calibri" pitchFamily="34" charset="0"/>
               </a:rPr>
-              <a:t>{{abstract}}</a:t>
-            </a:r>
+              <a:t>{abstract}</a:t>
+            </a:r>
+          </a:p>
+          <a:p>
+            <a:pPr marL="0" marR="0" lvl="0" indent="0" algn="ctr" defTabSz="914400" eaLnBrk="1" fontAlgn="auto" latinLnBrk="0" hangingPunct="1">
+              <a:lnSpc>
+                <a:spcPct val="100000"/>
+              </a:lnSpc>
+              <a:spcBef>
+                <a:spcPts val="0"/>
+              </a:spcBef>
+              <a:spcAft>
+                <a:spcPts val="0"/>
+              </a:spcAft>
+              <a:buClrTx/>
+              <a:buSzTx/>
+              <a:buFontTx/>
+              <a:buNone/>
+              <a:tabLst/>
+              <a:defRPr/>
+            </a:pPr>
             <a:r>
               <a:rPr lang="en-US" sz="2200" kern="0" noProof="0" dirty="0" smtClean="0">
                 <a:solidFill>
@@ -4476,8 +4495,27 @@
                 </a:solidFill>
                 <a:latin typeface="Calibri" pitchFamily="34" charset="0"/>
               </a:rPr>
-              <a:t>{{abstract}}</a:t>
-            </a:r>
+              <a:t>{abstract}</a:t>
+            </a:r>
+          </a:p>
+          <a:p>
+            <a:pPr marL="0" marR="0" lvl="0" indent="0" algn="ctr" defTabSz="914400" eaLnBrk="1" fontAlgn="auto" latinLnBrk="0" hangingPunct="1">
+              <a:lnSpc>
+                <a:spcPct val="100000"/>
+              </a:lnSpc>
+              <a:spcBef>
+                <a:spcPts val="0"/>
+              </a:spcBef>
+              <a:spcAft>
+                <a:spcPts val="0"/>
+              </a:spcAft>
+              <a:buClrTx/>
+              <a:buSzTx/>
+              <a:buFontTx/>
+              <a:buNone/>
+              <a:tabLst/>
+              <a:defRPr/>
+            </a:pPr>
             <a:r>
               <a:rPr lang="en-US" sz="2200" kern="0" noProof="0" dirty="0" smtClean="0">
                 <a:solidFill>
@@ -6330,8 +6368,27 @@
                 </a:solidFill>
                 <a:latin typeface="Calibri" pitchFamily="34" charset="0"/>
               </a:rPr>
-              <a:t>{{abstract}}</a:t>
-            </a:r>
+              <a:t>{abstract}</a:t>
+            </a:r>
+          </a:p>
+          <a:p>
+            <a:pPr marL="0" marR="0" lvl="0" indent="0" algn="ctr" defTabSz="914400" eaLnBrk="1" fontAlgn="auto" latinLnBrk="0" hangingPunct="1">
+              <a:lnSpc>
+                <a:spcPct val="100000"/>
+              </a:lnSpc>
+              <a:spcBef>
+                <a:spcPts val="0"/>
+              </a:spcBef>
+              <a:spcAft>
+                <a:spcPts val="0"/>
+              </a:spcAft>
+              <a:buClrTx/>
+              <a:buSzTx/>
+              <a:buFontTx/>
+              <a:buNone/>
+              <a:tabLst/>
+              <a:defRPr/>
+            </a:pPr>
             <a:r>
               <a:rPr lang="en-US" sz="2200" kern="0" noProof="0" dirty="0" smtClean="0">
                 <a:solidFill>

</xml_diff>

<commit_message>
modelling/structure/advanced: fix typo in question paly() -> challenge()
</commit_message>
<xml_diff>
--- a/diagrams/modelling/modellingStructures/classDiagramsAdvanced/playerBot.pptx
+++ b/diagrams/modelling/modellingStructures/classDiagramsAdvanced/playerBot.pptx
@@ -306,7 +306,7 @@
           <a:p>
             <a:fld id="{A0F86979-30DA-49EE-A740-32EBA6D2B7DE}" type="datetimeFigureOut">
               <a:rPr lang="en-SG" smtClean="0"/>
-              <a:t>18/10/2017</a:t>
+              <a:t>24/11/2017</a:t>
             </a:fld>
             <a:endParaRPr lang="en-SG"/>
           </a:p>
@@ -476,7 +476,7 @@
           <a:p>
             <a:fld id="{A0F86979-30DA-49EE-A740-32EBA6D2B7DE}" type="datetimeFigureOut">
               <a:rPr lang="en-SG" smtClean="0"/>
-              <a:t>18/10/2017</a:t>
+              <a:t>24/11/2017</a:t>
             </a:fld>
             <a:endParaRPr lang="en-SG"/>
           </a:p>
@@ -656,7 +656,7 @@
           <a:p>
             <a:fld id="{A0F86979-30DA-49EE-A740-32EBA6D2B7DE}" type="datetimeFigureOut">
               <a:rPr lang="en-SG" smtClean="0"/>
-              <a:t>18/10/2017</a:t>
+              <a:t>24/11/2017</a:t>
             </a:fld>
             <a:endParaRPr lang="en-SG"/>
           </a:p>
@@ -826,7 +826,7 @@
           <a:p>
             <a:fld id="{A0F86979-30DA-49EE-A740-32EBA6D2B7DE}" type="datetimeFigureOut">
               <a:rPr lang="en-SG" smtClean="0"/>
-              <a:t>18/10/2017</a:t>
+              <a:t>24/11/2017</a:t>
             </a:fld>
             <a:endParaRPr lang="en-SG"/>
           </a:p>
@@ -1072,7 +1072,7 @@
           <a:p>
             <a:fld id="{A0F86979-30DA-49EE-A740-32EBA6D2B7DE}" type="datetimeFigureOut">
               <a:rPr lang="en-SG" smtClean="0"/>
-              <a:t>18/10/2017</a:t>
+              <a:t>24/11/2017</a:t>
             </a:fld>
             <a:endParaRPr lang="en-SG"/>
           </a:p>
@@ -1360,7 +1360,7 @@
           <a:p>
             <a:fld id="{A0F86979-30DA-49EE-A740-32EBA6D2B7DE}" type="datetimeFigureOut">
               <a:rPr lang="en-SG" smtClean="0"/>
-              <a:t>18/10/2017</a:t>
+              <a:t>24/11/2017</a:t>
             </a:fld>
             <a:endParaRPr lang="en-SG"/>
           </a:p>
@@ -1782,7 +1782,7 @@
           <a:p>
             <a:fld id="{A0F86979-30DA-49EE-A740-32EBA6D2B7DE}" type="datetimeFigureOut">
               <a:rPr lang="en-SG" smtClean="0"/>
-              <a:t>18/10/2017</a:t>
+              <a:t>24/11/2017</a:t>
             </a:fld>
             <a:endParaRPr lang="en-SG"/>
           </a:p>
@@ -1900,7 +1900,7 @@
           <a:p>
             <a:fld id="{A0F86979-30DA-49EE-A740-32EBA6D2B7DE}" type="datetimeFigureOut">
               <a:rPr lang="en-SG" smtClean="0"/>
-              <a:t>18/10/2017</a:t>
+              <a:t>24/11/2017</a:t>
             </a:fld>
             <a:endParaRPr lang="en-SG"/>
           </a:p>
@@ -1995,7 +1995,7 @@
           <a:p>
             <a:fld id="{A0F86979-30DA-49EE-A740-32EBA6D2B7DE}" type="datetimeFigureOut">
               <a:rPr lang="en-SG" smtClean="0"/>
-              <a:t>18/10/2017</a:t>
+              <a:t>24/11/2017</a:t>
             </a:fld>
             <a:endParaRPr lang="en-SG"/>
           </a:p>
@@ -2272,7 +2272,7 @@
           <a:p>
             <a:fld id="{A0F86979-30DA-49EE-A740-32EBA6D2B7DE}" type="datetimeFigureOut">
               <a:rPr lang="en-SG" smtClean="0"/>
-              <a:t>18/10/2017</a:t>
+              <a:t>24/11/2017</a:t>
             </a:fld>
             <a:endParaRPr lang="en-SG"/>
           </a:p>
@@ -2525,7 +2525,7 @@
           <a:p>
             <a:fld id="{A0F86979-30DA-49EE-A740-32EBA6D2B7DE}" type="datetimeFigureOut">
               <a:rPr lang="en-SG" smtClean="0"/>
-              <a:t>18/10/2017</a:t>
+              <a:t>24/11/2017</a:t>
             </a:fld>
             <a:endParaRPr lang="en-SG"/>
           </a:p>
@@ -2738,7 +2738,7 @@
           <a:p>
             <a:fld id="{A0F86979-30DA-49EE-A740-32EBA6D2B7DE}" type="datetimeFigureOut">
               <a:rPr lang="en-SG" smtClean="0"/>
-              <a:t>18/10/2017</a:t>
+              <a:t>24/11/2017</a:t>
             </a:fld>
             <a:endParaRPr lang="en-SG"/>
           </a:p>
@@ -3227,7 +3227,7 @@
         <p:spPr>
           <a:xfrm>
             <a:off x="5303679" y="5127076"/>
-            <a:ext cx="1368152" cy="430887"/>
+            <a:ext cx="1500570" cy="430887"/>
           </a:xfrm>
           <a:prstGeom prst="rect">
             <a:avLst/>
@@ -3397,8 +3397,8 @@
         </p:nvCxnSpPr>
         <p:spPr>
           <a:xfrm rot="16200000" flipV="1">
-            <a:off x="4116186" y="3255506"/>
-            <a:ext cx="1967740" cy="1775399"/>
+            <a:off x="4149290" y="3222402"/>
+            <a:ext cx="1967740" cy="1841608"/>
           </a:xfrm>
           <a:prstGeom prst="bentConnector3">
             <a:avLst>
@@ -3591,7 +3591,7 @@
                 <a:latin typeface="Calibri" pitchFamily="34" charset="0"/>
                 <a:cs typeface="Arial" charset="0"/>
               </a:rPr>
-              <a:t>play()</a:t>
+              <a:t>challenge()</a:t>
             </a:r>
             <a:endParaRPr lang="en-US" sz="2000" dirty="0">
               <a:solidFill>
@@ -4040,6 +4040,330 @@
           </a:fontRef>
         </p:style>
       </p:cxnSp>
+      <p:sp>
+        <p:nvSpPr>
+          <p:cNvPr id="18" name="Rectangle 17"/>
+          <p:cNvSpPr/>
+          <p:nvPr/>
+        </p:nvSpPr>
+        <p:spPr>
+          <a:xfrm>
+            <a:off x="1976112" y="5557732"/>
+            <a:ext cx="1663385" cy="225810"/>
+          </a:xfrm>
+          <a:prstGeom prst="rect">
+            <a:avLst/>
+          </a:prstGeom>
+          <a:ln/>
+        </p:spPr>
+        <p:style>
+          <a:lnRef idx="1">
+            <a:schemeClr val="accent4"/>
+          </a:lnRef>
+          <a:fillRef idx="2">
+            <a:schemeClr val="accent4"/>
+          </a:fillRef>
+          <a:effectRef idx="1">
+            <a:schemeClr val="accent4"/>
+          </a:effectRef>
+          <a:fontRef idx="minor">
+            <a:schemeClr val="dk1"/>
+          </a:fontRef>
+        </p:style>
+        <p:txBody>
+          <a:bodyPr wrap="square" rtlCol="0" anchor="ctr">
+            <a:noAutofit/>
+          </a:bodyPr>
+          <a:lstStyle/>
+          <a:p>
+            <a:pPr marL="0" marR="0" lvl="0" indent="0" algn="ctr" defTabSz="914400" eaLnBrk="1" fontAlgn="auto" latinLnBrk="0" hangingPunct="1">
+              <a:lnSpc>
+                <a:spcPct val="100000"/>
+              </a:lnSpc>
+              <a:spcBef>
+                <a:spcPts val="0"/>
+              </a:spcBef>
+              <a:spcAft>
+                <a:spcPts val="0"/>
+              </a:spcAft>
+              <a:buClrTx/>
+              <a:buSzTx/>
+              <a:buFontTx/>
+              <a:buNone/>
+              <a:tabLst/>
+              <a:defRPr/>
+            </a:pPr>
+            <a:endParaRPr kumimoji="0" lang="en-US" sz="2200" b="0" i="0" u="none" strike="noStrike" kern="0" cap="none" spc="0" normalizeH="0" baseline="0" noProof="0" dirty="0">
+              <a:ln>
+                <a:noFill/>
+              </a:ln>
+              <a:solidFill>
+                <a:sysClr val="windowText" lastClr="000000"/>
+              </a:solidFill>
+              <a:effectLst/>
+              <a:uLnTx/>
+              <a:uFillTx/>
+              <a:latin typeface="Calibri" pitchFamily="34" charset="0"/>
+            </a:endParaRPr>
+          </a:p>
+        </p:txBody>
+      </p:sp>
+      <p:sp>
+        <p:nvSpPr>
+          <p:cNvPr id="19" name="Rectangle 18"/>
+          <p:cNvSpPr/>
+          <p:nvPr/>
+        </p:nvSpPr>
+        <p:spPr>
+          <a:xfrm>
+            <a:off x="1976111" y="5670637"/>
+            <a:ext cx="1663385" cy="656536"/>
+          </a:xfrm>
+          <a:prstGeom prst="rect">
+            <a:avLst/>
+          </a:prstGeom>
+          <a:ln/>
+        </p:spPr>
+        <p:style>
+          <a:lnRef idx="1">
+            <a:schemeClr val="accent4"/>
+          </a:lnRef>
+          <a:fillRef idx="2">
+            <a:schemeClr val="accent4"/>
+          </a:fillRef>
+          <a:effectRef idx="1">
+            <a:schemeClr val="accent4"/>
+          </a:effectRef>
+          <a:fontRef idx="minor">
+            <a:schemeClr val="dk1"/>
+          </a:fontRef>
+        </p:style>
+        <p:txBody>
+          <a:bodyPr wrap="square" rtlCol="0" anchor="ctr">
+            <a:noAutofit/>
+          </a:bodyPr>
+          <a:lstStyle/>
+          <a:p>
+            <a:pPr marL="0" marR="0" lvl="0" indent="0" defTabSz="914400" eaLnBrk="1" fontAlgn="auto" latinLnBrk="0" hangingPunct="1">
+              <a:lnSpc>
+                <a:spcPct val="100000"/>
+              </a:lnSpc>
+              <a:spcBef>
+                <a:spcPts val="0"/>
+              </a:spcBef>
+              <a:spcAft>
+                <a:spcPts val="0"/>
+              </a:spcAft>
+              <a:buClrTx/>
+              <a:buSzTx/>
+              <a:buFontTx/>
+              <a:buNone/>
+              <a:tabLst/>
+              <a:defRPr/>
+            </a:pPr>
+            <a:r>
+              <a:rPr kumimoji="0" lang="en-US" sz="2200" b="0" i="0" u="none" strike="noStrike" kern="0" cap="none" spc="0" normalizeH="0" baseline="0" noProof="0" dirty="0" smtClean="0">
+                <a:ln>
+                  <a:noFill/>
+                </a:ln>
+                <a:solidFill>
+                  <a:sysClr val="windowText" lastClr="000000"/>
+                </a:solidFill>
+                <a:effectLst/>
+                <a:uLnTx/>
+                <a:uFillTx/>
+                <a:latin typeface="Calibri" pitchFamily="34" charset="0"/>
+              </a:rPr>
+              <a:t>train()</a:t>
+            </a:r>
+          </a:p>
+          <a:p>
+            <a:pPr marL="0" marR="0" lvl="0" indent="0" defTabSz="914400" eaLnBrk="1" fontAlgn="auto" latinLnBrk="0" hangingPunct="1">
+              <a:lnSpc>
+                <a:spcPct val="100000"/>
+              </a:lnSpc>
+              <a:spcBef>
+                <a:spcPts val="0"/>
+              </a:spcBef>
+              <a:spcAft>
+                <a:spcPts val="0"/>
+              </a:spcAft>
+              <a:buClrTx/>
+              <a:buSzTx/>
+              <a:buFontTx/>
+              <a:buNone/>
+              <a:tabLst/>
+              <a:defRPr/>
+            </a:pPr>
+            <a:r>
+              <a:rPr lang="en-US" sz="2200" kern="0" dirty="0" smtClean="0">
+                <a:solidFill>
+                  <a:sysClr val="windowText" lastClr="000000"/>
+                </a:solidFill>
+                <a:latin typeface="Calibri" pitchFamily="34" charset="0"/>
+              </a:rPr>
+              <a:t>challenge()</a:t>
+            </a:r>
+            <a:endParaRPr kumimoji="0" lang="en-US" sz="2200" b="0" i="0" u="none" strike="noStrike" kern="0" cap="none" spc="0" normalizeH="0" baseline="0" noProof="0" dirty="0">
+              <a:ln>
+                <a:noFill/>
+              </a:ln>
+              <a:solidFill>
+                <a:sysClr val="windowText" lastClr="000000"/>
+              </a:solidFill>
+              <a:effectLst/>
+              <a:uLnTx/>
+              <a:uFillTx/>
+              <a:latin typeface="Calibri" pitchFamily="34" charset="0"/>
+            </a:endParaRPr>
+          </a:p>
+        </p:txBody>
+      </p:sp>
+      <p:sp>
+        <p:nvSpPr>
+          <p:cNvPr id="20" name="Rectangle 19"/>
+          <p:cNvSpPr/>
+          <p:nvPr/>
+        </p:nvSpPr>
+        <p:spPr>
+          <a:xfrm>
+            <a:off x="5303678" y="5557732"/>
+            <a:ext cx="1500572" cy="225810"/>
+          </a:xfrm>
+          <a:prstGeom prst="rect">
+            <a:avLst/>
+          </a:prstGeom>
+          <a:ln/>
+        </p:spPr>
+        <p:style>
+          <a:lnRef idx="1">
+            <a:schemeClr val="accent2"/>
+          </a:lnRef>
+          <a:fillRef idx="2">
+            <a:schemeClr val="accent2"/>
+          </a:fillRef>
+          <a:effectRef idx="1">
+            <a:schemeClr val="accent2"/>
+          </a:effectRef>
+          <a:fontRef idx="minor">
+            <a:schemeClr val="dk1"/>
+          </a:fontRef>
+        </p:style>
+        <p:txBody>
+          <a:bodyPr wrap="square" rtlCol="0" anchor="ctr">
+            <a:noAutofit/>
+          </a:bodyPr>
+          <a:lstStyle/>
+          <a:p>
+            <a:pPr marL="0" marR="0" lvl="0" indent="0" algn="ctr" defTabSz="914400" eaLnBrk="1" fontAlgn="auto" latinLnBrk="0" hangingPunct="1">
+              <a:lnSpc>
+                <a:spcPct val="100000"/>
+              </a:lnSpc>
+              <a:spcBef>
+                <a:spcPts val="0"/>
+              </a:spcBef>
+              <a:spcAft>
+                <a:spcPts val="0"/>
+              </a:spcAft>
+              <a:buClrTx/>
+              <a:buSzTx/>
+              <a:buFontTx/>
+              <a:buNone/>
+              <a:tabLst/>
+              <a:defRPr/>
+            </a:pPr>
+            <a:endParaRPr kumimoji="0" lang="en-US" sz="2200" b="0" i="0" u="none" strike="noStrike" kern="0" cap="none" spc="0" normalizeH="0" baseline="0" noProof="0" dirty="0">
+              <a:ln>
+                <a:noFill/>
+              </a:ln>
+              <a:solidFill>
+                <a:sysClr val="windowText" lastClr="000000"/>
+              </a:solidFill>
+              <a:effectLst/>
+              <a:uLnTx/>
+              <a:uFillTx/>
+              <a:latin typeface="Calibri" pitchFamily="34" charset="0"/>
+            </a:endParaRPr>
+          </a:p>
+        </p:txBody>
+      </p:sp>
+      <p:sp>
+        <p:nvSpPr>
+          <p:cNvPr id="21" name="Rectangle 20"/>
+          <p:cNvSpPr/>
+          <p:nvPr/>
+        </p:nvSpPr>
+        <p:spPr>
+          <a:xfrm>
+            <a:off x="5303679" y="5670637"/>
+            <a:ext cx="1500570" cy="447039"/>
+          </a:xfrm>
+          <a:prstGeom prst="rect">
+            <a:avLst/>
+          </a:prstGeom>
+          <a:ln/>
+        </p:spPr>
+        <p:style>
+          <a:lnRef idx="1">
+            <a:schemeClr val="accent2"/>
+          </a:lnRef>
+          <a:fillRef idx="2">
+            <a:schemeClr val="accent2"/>
+          </a:fillRef>
+          <a:effectRef idx="1">
+            <a:schemeClr val="accent2"/>
+          </a:effectRef>
+          <a:fontRef idx="minor">
+            <a:schemeClr val="dk1"/>
+          </a:fontRef>
+        </p:style>
+        <p:txBody>
+          <a:bodyPr wrap="square" rtlCol="0" anchor="ctr">
+            <a:noAutofit/>
+          </a:bodyPr>
+          <a:lstStyle/>
+          <a:p>
+            <a:pPr marL="0" marR="0" lvl="0" indent="0" defTabSz="914400" eaLnBrk="1" fontAlgn="auto" latinLnBrk="0" hangingPunct="1">
+              <a:lnSpc>
+                <a:spcPct val="100000"/>
+              </a:lnSpc>
+              <a:spcBef>
+                <a:spcPts val="0"/>
+              </a:spcBef>
+              <a:spcAft>
+                <a:spcPts val="0"/>
+              </a:spcAft>
+              <a:buClrTx/>
+              <a:buSzTx/>
+              <a:buFontTx/>
+              <a:buNone/>
+              <a:tabLst/>
+              <a:defRPr/>
+            </a:pPr>
+            <a:r>
+              <a:rPr lang="en-US" sz="2200" kern="0" dirty="0" smtClean="0">
+                <a:solidFill>
+                  <a:sysClr val="windowText" lastClr="000000"/>
+                </a:solidFill>
+                <a:latin typeface="Calibri" pitchFamily="34" charset="0"/>
+              </a:rPr>
+              <a:t>challenge()</a:t>
+            </a:r>
+            <a:endParaRPr kumimoji="0" lang="en-US" sz="2200" b="0" i="0" u="none" strike="noStrike" kern="0" cap="none" spc="0" normalizeH="0" baseline="0" noProof="0" dirty="0">
+              <a:ln>
+                <a:noFill/>
+              </a:ln>
+              <a:solidFill>
+                <a:sysClr val="windowText" lastClr="000000"/>
+              </a:solidFill>
+              <a:effectLst/>
+              <a:uLnTx/>
+              <a:uFillTx/>
+              <a:latin typeface="Calibri" pitchFamily="34" charset="0"/>
+            </a:endParaRPr>
+          </a:p>
+        </p:txBody>
+      </p:sp>
     </p:spTree>
     <p:extLst>
       <p:ext uri="{BB962C8B-B14F-4D97-AF65-F5344CB8AC3E}">
@@ -4379,6 +4703,114 @@
                                   </p:childTnLst>
                                 </p:cTn>
                               </p:par>
+                              <p:par>
+                                <p:cTn id="29" presetID="1" presetClass="entr" presetSubtype="0" fill="hold" grpId="0" nodeType="withEffect">
+                                  <p:stCondLst>
+                                    <p:cond delay="0"/>
+                                  </p:stCondLst>
+                                  <p:childTnLst>
+                                    <p:set>
+                                      <p:cBhvr>
+                                        <p:cTn id="30" dur="1" fill="hold">
+                                          <p:stCondLst>
+                                            <p:cond delay="0"/>
+                                          </p:stCondLst>
+                                        </p:cTn>
+                                        <p:tgtEl>
+                                          <p:spTgt spid="18"/>
+                                        </p:tgtEl>
+                                        <p:attrNameLst>
+                                          <p:attrName>style.visibility</p:attrName>
+                                        </p:attrNameLst>
+                                      </p:cBhvr>
+                                      <p:to>
+                                        <p:strVal val="visible"/>
+                                      </p:to>
+                                    </p:set>
+                                  </p:childTnLst>
+                                </p:cTn>
+                              </p:par>
+                              <p:par>
+                                <p:cTn id="31" presetID="1" presetClass="entr" presetSubtype="0" fill="hold" grpId="0" nodeType="withEffect">
+                                  <p:stCondLst>
+                                    <p:cond delay="0"/>
+                                  </p:stCondLst>
+                                  <p:childTnLst>
+                                    <p:set>
+                                      <p:cBhvr>
+                                        <p:cTn id="32" dur="1" fill="hold">
+                                          <p:stCondLst>
+                                            <p:cond delay="0"/>
+                                          </p:stCondLst>
+                                        </p:cTn>
+                                        <p:tgtEl>
+                                          <p:spTgt spid="19"/>
+                                        </p:tgtEl>
+                                        <p:attrNameLst>
+                                          <p:attrName>style.visibility</p:attrName>
+                                        </p:attrNameLst>
+                                      </p:cBhvr>
+                                      <p:to>
+                                        <p:strVal val="visible"/>
+                                      </p:to>
+                                    </p:set>
+                                  </p:childTnLst>
+                                </p:cTn>
+                              </p:par>
+                              <p:par>
+                                <p:cTn id="33" presetID="1" presetClass="entr" presetSubtype="0" fill="hold" grpId="0" nodeType="withEffect">
+                                  <p:stCondLst>
+                                    <p:cond delay="0"/>
+                                  </p:stCondLst>
+                                  <p:childTnLst>
+                                    <p:set>
+                                      <p:cBhvr>
+                                        <p:cTn id="34" dur="1" fill="hold">
+                                          <p:stCondLst>
+                                            <p:cond delay="0"/>
+                                          </p:stCondLst>
+                                        </p:cTn>
+                                        <p:tgtEl>
+                                          <p:spTgt spid="20"/>
+                                        </p:tgtEl>
+                                        <p:attrNameLst>
+                                          <p:attrName>style.visibility</p:attrName>
+                                        </p:attrNameLst>
+                                      </p:cBhvr>
+                                      <p:to>
+                                        <p:strVal val="visible"/>
+                                      </p:to>
+                                    </p:set>
+                                  </p:childTnLst>
+                                </p:cTn>
+                              </p:par>
+                              <p:par>
+                                <p:cTn id="35" presetID="1" presetClass="entr" presetSubtype="0" fill="hold" grpId="0" nodeType="withEffect">
+                                  <p:stCondLst>
+                                    <p:cond delay="0"/>
+                                  </p:stCondLst>
+                                  <p:childTnLst>
+                                    <p:set>
+                                      <p:cBhvr>
+                                        <p:cTn id="36" dur="1" fill="hold">
+                                          <p:stCondLst>
+                                            <p:cond delay="0"/>
+                                          </p:stCondLst>
+                                        </p:cTn>
+                                        <p:tgtEl>
+                                          <p:spTgt spid="21"/>
+                                        </p:tgtEl>
+                                        <p:attrNameLst>
+                                          <p:attrName>style.visibility</p:attrName>
+                                        </p:attrNameLst>
+                                      </p:cBhvr>
+                                      <p:to>
+                                        <p:strVal val="visible"/>
+                                      </p:to>
+                                    </p:set>
+                                  </p:childTnLst>
+                                </p:cTn>
+                              </p:par>
                             </p:childTnLst>
                           </p:cTn>
                         </p:par>
@@ -4413,6 +4845,10 @@
       <p:bldP spid="27" grpId="0" animBg="1"/>
       <p:bldP spid="29" grpId="0" animBg="1"/>
       <p:bldP spid="31" grpId="0" animBg="1"/>
+      <p:bldP spid="18" grpId="0" animBg="1"/>
+      <p:bldP spid="19" grpId="0" animBg="1"/>
+      <p:bldP spid="20" grpId="0" animBg="1"/>
+      <p:bldP spid="21" grpId="0" animBg="1"/>
     </p:bldLst>
   </p:timing>
 </p:sld>
@@ -4549,7 +4985,7 @@
         <p:spPr>
           <a:xfrm>
             <a:off x="5303679" y="5127076"/>
-            <a:ext cx="1368152" cy="430887"/>
+            <a:ext cx="1500570" cy="430887"/>
           </a:xfrm>
           <a:prstGeom prst="rect">
             <a:avLst/>
@@ -4625,7 +5061,7 @@
         </p:nvSpPr>
         <p:spPr>
           <a:xfrm>
-            <a:off x="3866254" y="5958572"/>
+            <a:off x="3787511" y="5937532"/>
             <a:ext cx="1368152" cy="430887"/>
           </a:xfrm>
           <a:prstGeom prst="rect">
@@ -4964,8 +5400,8 @@
         </p:nvCxnSpPr>
         <p:spPr>
           <a:xfrm rot="16200000" flipV="1">
-            <a:off x="4116186" y="3255506"/>
-            <a:ext cx="1967740" cy="1775399"/>
+            <a:off x="4149290" y="3222402"/>
+            <a:ext cx="1967740" cy="1841608"/>
           </a:xfrm>
           <a:prstGeom prst="bentConnector3">
             <a:avLst>
@@ -5158,7 +5594,7 @@
                 <a:latin typeface="Calibri" pitchFamily="34" charset="0"/>
                 <a:cs typeface="Arial" charset="0"/>
               </a:rPr>
-              <a:t>play()</a:t>
+              <a:t>challenge()</a:t>
             </a:r>
             <a:endParaRPr lang="en-US" sz="2000" dirty="0">
               <a:solidFill>
@@ -5853,6 +6289,330 @@
                   <a:lumMod val="75000"/>
                 </a:schemeClr>
               </a:solidFill>
+            </a:endParaRPr>
+          </a:p>
+        </p:txBody>
+      </p:sp>
+      <p:sp>
+        <p:nvSpPr>
+          <p:cNvPr id="30" name="Rectangle 17"/>
+          <p:cNvSpPr/>
+          <p:nvPr/>
+        </p:nvSpPr>
+        <p:spPr>
+          <a:xfrm>
+            <a:off x="1976112" y="5557732"/>
+            <a:ext cx="1663385" cy="225810"/>
+          </a:xfrm>
+          <a:prstGeom prst="rect">
+            <a:avLst/>
+          </a:prstGeom>
+          <a:ln/>
+        </p:spPr>
+        <p:style>
+          <a:lnRef idx="1">
+            <a:schemeClr val="accent4"/>
+          </a:lnRef>
+          <a:fillRef idx="2">
+            <a:schemeClr val="accent4"/>
+          </a:fillRef>
+          <a:effectRef idx="1">
+            <a:schemeClr val="accent4"/>
+          </a:effectRef>
+          <a:fontRef idx="minor">
+            <a:schemeClr val="dk1"/>
+          </a:fontRef>
+        </p:style>
+        <p:txBody>
+          <a:bodyPr wrap="square" rtlCol="0" anchor="ctr">
+            <a:noAutofit/>
+          </a:bodyPr>
+          <a:lstStyle/>
+          <a:p>
+            <a:pPr marL="0" marR="0" lvl="0" indent="0" algn="ctr" defTabSz="914400" eaLnBrk="1" fontAlgn="auto" latinLnBrk="0" hangingPunct="1">
+              <a:lnSpc>
+                <a:spcPct val="100000"/>
+              </a:lnSpc>
+              <a:spcBef>
+                <a:spcPts val="0"/>
+              </a:spcBef>
+              <a:spcAft>
+                <a:spcPts val="0"/>
+              </a:spcAft>
+              <a:buClrTx/>
+              <a:buSzTx/>
+              <a:buFontTx/>
+              <a:buNone/>
+              <a:tabLst/>
+              <a:defRPr/>
+            </a:pPr>
+            <a:endParaRPr kumimoji="0" lang="en-US" sz="2200" b="0" i="0" u="none" strike="noStrike" kern="0" cap="none" spc="0" normalizeH="0" baseline="0" noProof="0" dirty="0">
+              <a:ln>
+                <a:noFill/>
+              </a:ln>
+              <a:solidFill>
+                <a:sysClr val="windowText" lastClr="000000"/>
+              </a:solidFill>
+              <a:effectLst/>
+              <a:uLnTx/>
+              <a:uFillTx/>
+              <a:latin typeface="Calibri" pitchFamily="34" charset="0"/>
+            </a:endParaRPr>
+          </a:p>
+        </p:txBody>
+      </p:sp>
+      <p:sp>
+        <p:nvSpPr>
+          <p:cNvPr id="33" name="Rectangle 18"/>
+          <p:cNvSpPr/>
+          <p:nvPr/>
+        </p:nvSpPr>
+        <p:spPr>
+          <a:xfrm>
+            <a:off x="1976111" y="5670637"/>
+            <a:ext cx="1663385" cy="656536"/>
+          </a:xfrm>
+          <a:prstGeom prst="rect">
+            <a:avLst/>
+          </a:prstGeom>
+          <a:ln/>
+        </p:spPr>
+        <p:style>
+          <a:lnRef idx="1">
+            <a:schemeClr val="accent4"/>
+          </a:lnRef>
+          <a:fillRef idx="2">
+            <a:schemeClr val="accent4"/>
+          </a:fillRef>
+          <a:effectRef idx="1">
+            <a:schemeClr val="accent4"/>
+          </a:effectRef>
+          <a:fontRef idx="minor">
+            <a:schemeClr val="dk1"/>
+          </a:fontRef>
+        </p:style>
+        <p:txBody>
+          <a:bodyPr wrap="square" rtlCol="0" anchor="ctr">
+            <a:noAutofit/>
+          </a:bodyPr>
+          <a:lstStyle/>
+          <a:p>
+            <a:pPr marL="0" marR="0" lvl="0" indent="0" defTabSz="914400" eaLnBrk="1" fontAlgn="auto" latinLnBrk="0" hangingPunct="1">
+              <a:lnSpc>
+                <a:spcPct val="100000"/>
+              </a:lnSpc>
+              <a:spcBef>
+                <a:spcPts val="0"/>
+              </a:spcBef>
+              <a:spcAft>
+                <a:spcPts val="0"/>
+              </a:spcAft>
+              <a:buClrTx/>
+              <a:buSzTx/>
+              <a:buFontTx/>
+              <a:buNone/>
+              <a:tabLst/>
+              <a:defRPr/>
+            </a:pPr>
+            <a:r>
+              <a:rPr kumimoji="0" lang="en-US" sz="2200" b="0" i="0" u="none" strike="noStrike" kern="0" cap="none" spc="0" normalizeH="0" baseline="0" noProof="0" dirty="0" smtClean="0">
+                <a:ln>
+                  <a:noFill/>
+                </a:ln>
+                <a:solidFill>
+                  <a:sysClr val="windowText" lastClr="000000"/>
+                </a:solidFill>
+                <a:effectLst/>
+                <a:uLnTx/>
+                <a:uFillTx/>
+                <a:latin typeface="Calibri" pitchFamily="34" charset="0"/>
+              </a:rPr>
+              <a:t>train()</a:t>
+            </a:r>
+          </a:p>
+          <a:p>
+            <a:pPr marL="0" marR="0" lvl="0" indent="0" defTabSz="914400" eaLnBrk="1" fontAlgn="auto" latinLnBrk="0" hangingPunct="1">
+              <a:lnSpc>
+                <a:spcPct val="100000"/>
+              </a:lnSpc>
+              <a:spcBef>
+                <a:spcPts val="0"/>
+              </a:spcBef>
+              <a:spcAft>
+                <a:spcPts val="0"/>
+              </a:spcAft>
+              <a:buClrTx/>
+              <a:buSzTx/>
+              <a:buFontTx/>
+              <a:buNone/>
+              <a:tabLst/>
+              <a:defRPr/>
+            </a:pPr>
+            <a:r>
+              <a:rPr lang="en-US" sz="2200" kern="0" dirty="0" smtClean="0">
+                <a:solidFill>
+                  <a:sysClr val="windowText" lastClr="000000"/>
+                </a:solidFill>
+                <a:latin typeface="Calibri" pitchFamily="34" charset="0"/>
+              </a:rPr>
+              <a:t>challenge()</a:t>
+            </a:r>
+            <a:endParaRPr kumimoji="0" lang="en-US" sz="2200" b="0" i="0" u="none" strike="noStrike" kern="0" cap="none" spc="0" normalizeH="0" baseline="0" noProof="0" dirty="0">
+              <a:ln>
+                <a:noFill/>
+              </a:ln>
+              <a:solidFill>
+                <a:sysClr val="windowText" lastClr="000000"/>
+              </a:solidFill>
+              <a:effectLst/>
+              <a:uLnTx/>
+              <a:uFillTx/>
+              <a:latin typeface="Calibri" pitchFamily="34" charset="0"/>
+            </a:endParaRPr>
+          </a:p>
+        </p:txBody>
+      </p:sp>
+      <p:sp>
+        <p:nvSpPr>
+          <p:cNvPr id="34" name="Rectangle 19"/>
+          <p:cNvSpPr/>
+          <p:nvPr/>
+        </p:nvSpPr>
+        <p:spPr>
+          <a:xfrm>
+            <a:off x="5303678" y="5557732"/>
+            <a:ext cx="1500572" cy="225810"/>
+          </a:xfrm>
+          <a:prstGeom prst="rect">
+            <a:avLst/>
+          </a:prstGeom>
+          <a:ln/>
+        </p:spPr>
+        <p:style>
+          <a:lnRef idx="1">
+            <a:schemeClr val="accent2"/>
+          </a:lnRef>
+          <a:fillRef idx="2">
+            <a:schemeClr val="accent2"/>
+          </a:fillRef>
+          <a:effectRef idx="1">
+            <a:schemeClr val="accent2"/>
+          </a:effectRef>
+          <a:fontRef idx="minor">
+            <a:schemeClr val="dk1"/>
+          </a:fontRef>
+        </p:style>
+        <p:txBody>
+          <a:bodyPr wrap="square" rtlCol="0" anchor="ctr">
+            <a:noAutofit/>
+          </a:bodyPr>
+          <a:lstStyle/>
+          <a:p>
+            <a:pPr marL="0" marR="0" lvl="0" indent="0" algn="ctr" defTabSz="914400" eaLnBrk="1" fontAlgn="auto" latinLnBrk="0" hangingPunct="1">
+              <a:lnSpc>
+                <a:spcPct val="100000"/>
+              </a:lnSpc>
+              <a:spcBef>
+                <a:spcPts val="0"/>
+              </a:spcBef>
+              <a:spcAft>
+                <a:spcPts val="0"/>
+              </a:spcAft>
+              <a:buClrTx/>
+              <a:buSzTx/>
+              <a:buFontTx/>
+              <a:buNone/>
+              <a:tabLst/>
+              <a:defRPr/>
+            </a:pPr>
+            <a:endParaRPr kumimoji="0" lang="en-US" sz="2200" b="0" i="0" u="none" strike="noStrike" kern="0" cap="none" spc="0" normalizeH="0" baseline="0" noProof="0" dirty="0">
+              <a:ln>
+                <a:noFill/>
+              </a:ln>
+              <a:solidFill>
+                <a:sysClr val="windowText" lastClr="000000"/>
+              </a:solidFill>
+              <a:effectLst/>
+              <a:uLnTx/>
+              <a:uFillTx/>
+              <a:latin typeface="Calibri" pitchFamily="34" charset="0"/>
+            </a:endParaRPr>
+          </a:p>
+        </p:txBody>
+      </p:sp>
+      <p:sp>
+        <p:nvSpPr>
+          <p:cNvPr id="35" name="Rectangle 20"/>
+          <p:cNvSpPr/>
+          <p:nvPr/>
+        </p:nvSpPr>
+        <p:spPr>
+          <a:xfrm>
+            <a:off x="5303679" y="5670637"/>
+            <a:ext cx="1500570" cy="447039"/>
+          </a:xfrm>
+          <a:prstGeom prst="rect">
+            <a:avLst/>
+          </a:prstGeom>
+          <a:ln/>
+        </p:spPr>
+        <p:style>
+          <a:lnRef idx="1">
+            <a:schemeClr val="accent2"/>
+          </a:lnRef>
+          <a:fillRef idx="2">
+            <a:schemeClr val="accent2"/>
+          </a:fillRef>
+          <a:effectRef idx="1">
+            <a:schemeClr val="accent2"/>
+          </a:effectRef>
+          <a:fontRef idx="minor">
+            <a:schemeClr val="dk1"/>
+          </a:fontRef>
+        </p:style>
+        <p:txBody>
+          <a:bodyPr wrap="square" rtlCol="0" anchor="ctr">
+            <a:noAutofit/>
+          </a:bodyPr>
+          <a:lstStyle/>
+          <a:p>
+            <a:pPr marL="0" marR="0" lvl="0" indent="0" defTabSz="914400" eaLnBrk="1" fontAlgn="auto" latinLnBrk="0" hangingPunct="1">
+              <a:lnSpc>
+                <a:spcPct val="100000"/>
+              </a:lnSpc>
+              <a:spcBef>
+                <a:spcPts val="0"/>
+              </a:spcBef>
+              <a:spcAft>
+                <a:spcPts val="0"/>
+              </a:spcAft>
+              <a:buClrTx/>
+              <a:buSzTx/>
+              <a:buFontTx/>
+              <a:buNone/>
+              <a:tabLst/>
+              <a:defRPr/>
+            </a:pPr>
+            <a:r>
+              <a:rPr lang="en-US" sz="2200" kern="0" dirty="0" smtClean="0">
+                <a:solidFill>
+                  <a:sysClr val="windowText" lastClr="000000"/>
+                </a:solidFill>
+                <a:latin typeface="Calibri" pitchFamily="34" charset="0"/>
+              </a:rPr>
+              <a:t>challenge()</a:t>
+            </a:r>
+            <a:endParaRPr kumimoji="0" lang="en-US" sz="2200" b="0" i="0" u="none" strike="noStrike" kern="0" cap="none" spc="0" normalizeH="0" baseline="0" noProof="0" dirty="0">
+              <a:ln>
+                <a:noFill/>
+              </a:ln>
+              <a:solidFill>
+                <a:sysClr val="windowText" lastClr="000000"/>
+              </a:solidFill>
+              <a:effectLst/>
+              <a:uLnTx/>
+              <a:uFillTx/>
+              <a:latin typeface="Calibri" pitchFamily="34" charset="0"/>
             </a:endParaRPr>
           </a:p>
         </p:txBody>
@@ -6250,6 +7010,114 @@
                                   </p:childTnLst>
                                 </p:cTn>
                               </p:par>
+                              <p:par>
+                                <p:cTn id="33" presetID="1" presetClass="entr" presetSubtype="0" fill="hold" grpId="0" nodeType="withEffect">
+                                  <p:stCondLst>
+                                    <p:cond delay="0"/>
+                                  </p:stCondLst>
+                                  <p:childTnLst>
+                                    <p:set>
+                                      <p:cBhvr>
+                                        <p:cTn id="34" dur="1" fill="hold">
+                                          <p:stCondLst>
+                                            <p:cond delay="0"/>
+                                          </p:stCondLst>
+                                        </p:cTn>
+                                        <p:tgtEl>
+                                          <p:spTgt spid="30"/>
+                                        </p:tgtEl>
+                                        <p:attrNameLst>
+                                          <p:attrName>style.visibility</p:attrName>
+                                        </p:attrNameLst>
+                                      </p:cBhvr>
+                                      <p:to>
+                                        <p:strVal val="visible"/>
+                                      </p:to>
+                                    </p:set>
+                                  </p:childTnLst>
+                                </p:cTn>
+                              </p:par>
+                              <p:par>
+                                <p:cTn id="35" presetID="1" presetClass="entr" presetSubtype="0" fill="hold" grpId="0" nodeType="withEffect">
+                                  <p:stCondLst>
+                                    <p:cond delay="0"/>
+                                  </p:stCondLst>
+                                  <p:childTnLst>
+                                    <p:set>
+                                      <p:cBhvr>
+                                        <p:cTn id="36" dur="1" fill="hold">
+                                          <p:stCondLst>
+                                            <p:cond delay="0"/>
+                                          </p:stCondLst>
+                                        </p:cTn>
+                                        <p:tgtEl>
+                                          <p:spTgt spid="33"/>
+                                        </p:tgtEl>
+                                        <p:attrNameLst>
+                                          <p:attrName>style.visibility</p:attrName>
+                                        </p:attrNameLst>
+                                      </p:cBhvr>
+                                      <p:to>
+                                        <p:strVal val="visible"/>
+                                      </p:to>
+                                    </p:set>
+                                  </p:childTnLst>
+                                </p:cTn>
+                              </p:par>
+                              <p:par>
+                                <p:cTn id="37" presetID="1" presetClass="entr" presetSubtype="0" fill="hold" grpId="0" nodeType="withEffect">
+                                  <p:stCondLst>
+                                    <p:cond delay="0"/>
+                                  </p:stCondLst>
+                                  <p:childTnLst>
+                                    <p:set>
+                                      <p:cBhvr>
+                                        <p:cTn id="38" dur="1" fill="hold">
+                                          <p:stCondLst>
+                                            <p:cond delay="0"/>
+                                          </p:stCondLst>
+                                        </p:cTn>
+                                        <p:tgtEl>
+                                          <p:spTgt spid="34"/>
+                                        </p:tgtEl>
+                                        <p:attrNameLst>
+                                          <p:attrName>style.visibility</p:attrName>
+                                        </p:attrNameLst>
+                                      </p:cBhvr>
+                                      <p:to>
+                                        <p:strVal val="visible"/>
+                                      </p:to>
+                                    </p:set>
+                                  </p:childTnLst>
+                                </p:cTn>
+                              </p:par>
+                              <p:par>
+                                <p:cTn id="39" presetID="1" presetClass="entr" presetSubtype="0" fill="hold" grpId="0" nodeType="withEffect">
+                                  <p:stCondLst>
+                                    <p:cond delay="0"/>
+                                  </p:stCondLst>
+                                  <p:childTnLst>
+                                    <p:set>
+                                      <p:cBhvr>
+                                        <p:cTn id="40" dur="1" fill="hold">
+                                          <p:stCondLst>
+                                            <p:cond delay="0"/>
+                                          </p:stCondLst>
+                                        </p:cTn>
+                                        <p:tgtEl>
+                                          <p:spTgt spid="35"/>
+                                        </p:tgtEl>
+                                        <p:attrNameLst>
+                                          <p:attrName>style.visibility</p:attrName>
+                                        </p:attrNameLst>
+                                      </p:cBhvr>
+                                      <p:to>
+                                        <p:strVal val="visible"/>
+                                      </p:to>
+                                    </p:set>
+                                  </p:childTnLst>
+                                </p:cTn>
+                              </p:par>
                             </p:childTnLst>
                           </p:cTn>
                         </p:par>
@@ -6286,6 +7154,10 @@
       <p:bldP spid="29" grpId="0" animBg="1"/>
       <p:bldP spid="31" grpId="0" animBg="1"/>
       <p:bldP spid="45" grpId="0" animBg="1"/>
+      <p:bldP spid="30" grpId="0" animBg="1"/>
+      <p:bldP spid="33" grpId="0" animBg="1"/>
+      <p:bldP spid="34" grpId="0" animBg="1"/>
+      <p:bldP spid="35" grpId="0" animBg="1"/>
     </p:bldLst>
   </p:timing>
 </p:sld>
@@ -6316,7 +7188,7 @@
         </p:nvSpPr>
         <p:spPr>
           <a:xfrm>
-            <a:off x="2051720" y="3707029"/>
+            <a:off x="2051720" y="3030996"/>
             <a:ext cx="1512168" cy="769441"/>
           </a:xfrm>
           <a:prstGeom prst="rect">
@@ -6421,8 +7293,8 @@
         </p:nvSpPr>
         <p:spPr>
           <a:xfrm>
-            <a:off x="5303679" y="5127076"/>
-            <a:ext cx="1368152" cy="430887"/>
+            <a:off x="5303679" y="4451043"/>
+            <a:ext cx="1500570" cy="430887"/>
           </a:xfrm>
           <a:prstGeom prst="rect">
             <a:avLst/>
@@ -6498,7 +7370,7 @@
         </p:nvSpPr>
         <p:spPr>
           <a:xfrm>
-            <a:off x="3866254" y="5958572"/>
+            <a:off x="3890200" y="5886351"/>
             <a:ext cx="1368152" cy="430887"/>
           </a:xfrm>
           <a:prstGeom prst="rect">
@@ -6578,7 +7450,7 @@
         </p:nvCxnSpPr>
         <p:spPr>
           <a:xfrm rot="5400000" flipH="1" flipV="1">
-            <a:off x="3236234" y="2730907"/>
+            <a:off x="3236234" y="2054874"/>
             <a:ext cx="547693" cy="1404552"/>
           </a:xfrm>
           <a:prstGeom prst="bentConnector3">
@@ -6618,7 +7490,7 @@
         </p:nvSpPr>
         <p:spPr>
           <a:xfrm>
-            <a:off x="4082278" y="2930736"/>
+            <a:off x="4082278" y="2254703"/>
             <a:ext cx="260156" cy="228600"/>
           </a:xfrm>
           <a:prstGeom prst="flowChartExtract">
@@ -6669,8 +7541,8 @@
         </p:nvCxnSpPr>
         <p:spPr>
           <a:xfrm rot="16200000" flipV="1">
-            <a:off x="4116186" y="3255506"/>
-            <a:ext cx="1967740" cy="1775399"/>
+            <a:off x="4149290" y="2546369"/>
+            <a:ext cx="1967740" cy="1841608"/>
           </a:xfrm>
           <a:prstGeom prst="bentConnector3">
             <a:avLst>
@@ -6709,7 +7581,7 @@
         </p:nvSpPr>
         <p:spPr>
           <a:xfrm>
-            <a:off x="3059832" y="1577332"/>
+            <a:off x="3059832" y="901299"/>
             <a:ext cx="2233978" cy="591403"/>
           </a:xfrm>
           <a:prstGeom prst="rect">
@@ -6771,7 +7643,7 @@
         </p:nvSpPr>
         <p:spPr>
           <a:xfrm>
-            <a:off x="3059832" y="2164066"/>
+            <a:off x="3059832" y="1488033"/>
             <a:ext cx="2233978" cy="184813"/>
           </a:xfrm>
           <a:prstGeom prst="rect">
@@ -6814,7 +7686,7 @@
         </p:nvSpPr>
         <p:spPr>
           <a:xfrm>
-            <a:off x="3059832" y="2348880"/>
+            <a:off x="3059832" y="1672847"/>
             <a:ext cx="2233978" cy="549772"/>
           </a:xfrm>
           <a:prstGeom prst="rect">
@@ -6863,7 +7735,7 @@
                 <a:latin typeface="Calibri" pitchFamily="34" charset="0"/>
                 <a:cs typeface="Arial" charset="0"/>
               </a:rPr>
-              <a:t>play()</a:t>
+              <a:t>challenge()</a:t>
             </a:r>
             <a:endParaRPr lang="en-US" sz="2000" dirty="0">
               <a:solidFill>
@@ -6883,7 +7755,7 @@
         </p:nvSpPr>
         <p:spPr>
           <a:xfrm>
-            <a:off x="443748" y="1586376"/>
+            <a:off x="443748" y="910343"/>
             <a:ext cx="2233978" cy="591403"/>
           </a:xfrm>
           <a:prstGeom prst="rect">
@@ -6945,7 +7817,7 @@
         </p:nvSpPr>
         <p:spPr>
           <a:xfrm>
-            <a:off x="443748" y="2173110"/>
+            <a:off x="443748" y="1497077"/>
             <a:ext cx="2233978" cy="184813"/>
           </a:xfrm>
           <a:prstGeom prst="rect">
@@ -6988,7 +7860,7 @@
         </p:nvSpPr>
         <p:spPr>
           <a:xfrm>
-            <a:off x="443748" y="2357924"/>
+            <a:off x="443748" y="1681891"/>
             <a:ext cx="2233978" cy="549772"/>
           </a:xfrm>
           <a:prstGeom prst="rect">
@@ -7057,7 +7929,7 @@
         </p:nvSpPr>
         <p:spPr>
           <a:xfrm>
-            <a:off x="1976112" y="4956426"/>
+            <a:off x="1976112" y="4280393"/>
             <a:ext cx="1663385" cy="769441"/>
           </a:xfrm>
           <a:prstGeom prst="rect">
@@ -7137,7 +8009,7 @@
         </p:nvCxnSpPr>
         <p:spPr>
           <a:xfrm rot="16200000" flipV="1">
-            <a:off x="2693727" y="4842347"/>
+            <a:off x="2693727" y="4166314"/>
             <a:ext cx="228156" cy="1"/>
           </a:xfrm>
           <a:prstGeom prst="bentConnector3">
@@ -7177,7 +8049,7 @@
         </p:nvSpPr>
         <p:spPr>
           <a:xfrm>
-            <a:off x="2677726" y="4499670"/>
+            <a:off x="2677726" y="3823637"/>
             <a:ext cx="260156" cy="228600"/>
           </a:xfrm>
           <a:prstGeom prst="flowChartExtract">
@@ -7225,7 +8097,7 @@
         </p:nvSpPr>
         <p:spPr>
           <a:xfrm>
-            <a:off x="1554731" y="2933243"/>
+            <a:off x="1554731" y="2257210"/>
             <a:ext cx="260156" cy="228600"/>
           </a:xfrm>
           <a:prstGeom prst="flowChartExtract">
@@ -7279,7 +8151,7 @@
         </p:nvCxnSpPr>
         <p:spPr>
           <a:xfrm rot="10800000">
-            <a:off x="1684810" y="3161843"/>
+            <a:off x="1684810" y="2485810"/>
             <a:ext cx="291303" cy="2179304"/>
           </a:xfrm>
           <a:prstGeom prst="bentConnector2">
@@ -7320,7 +8192,7 @@
         </p:nvSpPr>
         <p:spPr>
           <a:xfrm>
-            <a:off x="6410799" y="1988840"/>
+            <a:off x="6410799" y="1312807"/>
             <a:ext cx="1368152" cy="430887"/>
           </a:xfrm>
           <a:prstGeom prst="rect">
@@ -7394,14 +8266,14 @@
           <p:cNvPr id="64" name="Elbow Connector 63"/>
           <p:cNvCxnSpPr>
             <a:stCxn id="18" idx="1"/>
-            <a:endCxn id="27" idx="2"/>
+            <a:endCxn id="38" idx="2"/>
           </p:cNvCxnSpPr>
           <p:nvPr/>
         </p:nvCxnSpPr>
         <p:spPr>
           <a:xfrm rot="10800000">
-            <a:off x="2807806" y="5725868"/>
-            <a:ext cx="1058449" cy="448149"/>
+            <a:off x="2807804" y="5651141"/>
+            <a:ext cx="1082396" cy="450655"/>
           </a:xfrm>
           <a:prstGeom prst="bentConnector2">
             <a:avLst/>
@@ -7434,14 +8306,14 @@
           <p:cNvPr id="65" name="Elbow Connector 64"/>
           <p:cNvCxnSpPr>
             <a:stCxn id="18" idx="3"/>
-            <a:endCxn id="17" idx="2"/>
+            <a:endCxn id="42" idx="2"/>
           </p:cNvCxnSpPr>
           <p:nvPr/>
         </p:nvCxnSpPr>
         <p:spPr>
           <a:xfrm flipV="1">
-            <a:off x="5234406" y="5557963"/>
-            <a:ext cx="753349" cy="616053"/>
+            <a:off x="5258352" y="5441643"/>
+            <a:ext cx="795612" cy="660152"/>
           </a:xfrm>
           <a:prstGeom prst="bentConnector2">
             <a:avLst/>
@@ -7477,7 +8349,7 @@
         </p:nvSpPr>
         <p:spPr>
           <a:xfrm>
-            <a:off x="5258352" y="1512745"/>
+            <a:off x="5258352" y="836712"/>
             <a:ext cx="1177793" cy="369332"/>
           </a:xfrm>
           <a:prstGeom prst="rect">
@@ -7519,7 +8391,7 @@
         </p:nvSpPr>
         <p:spPr>
           <a:xfrm>
-            <a:off x="5279452" y="2628092"/>
+            <a:off x="5279452" y="1952059"/>
             <a:ext cx="792927" cy="369332"/>
           </a:xfrm>
           <a:prstGeom prst="rect">
@@ -7564,7 +8436,7 @@
         </p:nvCxnSpPr>
         <p:spPr>
           <a:xfrm flipV="1">
-            <a:off x="5293810" y="2419727"/>
+            <a:off x="5293810" y="1743694"/>
             <a:ext cx="1801065" cy="204039"/>
           </a:xfrm>
           <a:prstGeom prst="bentConnector2">
@@ -7598,7 +8470,7 @@
         </p:nvCxnSpPr>
         <p:spPr>
           <a:xfrm>
-            <a:off x="5293810" y="1873034"/>
+            <a:off x="5293810" y="1197001"/>
             <a:ext cx="1801065" cy="115806"/>
           </a:xfrm>
           <a:prstGeom prst="bentConnector2">
@@ -7629,7 +8501,7 @@
         </p:nvSpPr>
         <p:spPr>
           <a:xfrm>
-            <a:off x="5970138" y="5561492"/>
+            <a:off x="5994084" y="5489271"/>
             <a:ext cx="928450" cy="369332"/>
           </a:xfrm>
           <a:prstGeom prst="rect">
@@ -7671,7 +8543,7 @@
         </p:nvSpPr>
         <p:spPr>
           <a:xfrm>
-            <a:off x="1879354" y="5725866"/>
+            <a:off x="1903300" y="5653645"/>
             <a:ext cx="928450" cy="369332"/>
           </a:xfrm>
           <a:prstGeom prst="rect">
@@ -7701,6 +8573,330 @@
                   <a:lumMod val="75000"/>
                 </a:schemeClr>
               </a:solidFill>
+            </a:endParaRPr>
+          </a:p>
+        </p:txBody>
+      </p:sp>
+      <p:sp>
+        <p:nvSpPr>
+          <p:cNvPr id="37" name="Rectangle 17"/>
+          <p:cNvSpPr/>
+          <p:nvPr/>
+        </p:nvSpPr>
+        <p:spPr>
+          <a:xfrm>
+            <a:off x="1976112" y="4881699"/>
+            <a:ext cx="1663385" cy="225810"/>
+          </a:xfrm>
+          <a:prstGeom prst="rect">
+            <a:avLst/>
+          </a:prstGeom>
+          <a:ln/>
+        </p:spPr>
+        <p:style>
+          <a:lnRef idx="1">
+            <a:schemeClr val="accent4"/>
+          </a:lnRef>
+          <a:fillRef idx="2">
+            <a:schemeClr val="accent4"/>
+          </a:fillRef>
+          <a:effectRef idx="1">
+            <a:schemeClr val="accent4"/>
+          </a:effectRef>
+          <a:fontRef idx="minor">
+            <a:schemeClr val="dk1"/>
+          </a:fontRef>
+        </p:style>
+        <p:txBody>
+          <a:bodyPr wrap="square" rtlCol="0" anchor="ctr">
+            <a:noAutofit/>
+          </a:bodyPr>
+          <a:lstStyle/>
+          <a:p>
+            <a:pPr marL="0" marR="0" lvl="0" indent="0" algn="ctr" defTabSz="914400" eaLnBrk="1" fontAlgn="auto" latinLnBrk="0" hangingPunct="1">
+              <a:lnSpc>
+                <a:spcPct val="100000"/>
+              </a:lnSpc>
+              <a:spcBef>
+                <a:spcPts val="0"/>
+              </a:spcBef>
+              <a:spcAft>
+                <a:spcPts val="0"/>
+              </a:spcAft>
+              <a:buClrTx/>
+              <a:buSzTx/>
+              <a:buFontTx/>
+              <a:buNone/>
+              <a:tabLst/>
+              <a:defRPr/>
+            </a:pPr>
+            <a:endParaRPr kumimoji="0" lang="en-US" sz="2200" b="0" i="0" u="none" strike="noStrike" kern="0" cap="none" spc="0" normalizeH="0" baseline="0" noProof="0" dirty="0">
+              <a:ln>
+                <a:noFill/>
+              </a:ln>
+              <a:solidFill>
+                <a:sysClr val="windowText" lastClr="000000"/>
+              </a:solidFill>
+              <a:effectLst/>
+              <a:uLnTx/>
+              <a:uFillTx/>
+              <a:latin typeface="Calibri" pitchFamily="34" charset="0"/>
+            </a:endParaRPr>
+          </a:p>
+        </p:txBody>
+      </p:sp>
+      <p:sp>
+        <p:nvSpPr>
+          <p:cNvPr id="38" name="Rectangle 18"/>
+          <p:cNvSpPr/>
+          <p:nvPr/>
+        </p:nvSpPr>
+        <p:spPr>
+          <a:xfrm>
+            <a:off x="1976111" y="4994604"/>
+            <a:ext cx="1663385" cy="656536"/>
+          </a:xfrm>
+          <a:prstGeom prst="rect">
+            <a:avLst/>
+          </a:prstGeom>
+          <a:ln/>
+        </p:spPr>
+        <p:style>
+          <a:lnRef idx="1">
+            <a:schemeClr val="accent4"/>
+          </a:lnRef>
+          <a:fillRef idx="2">
+            <a:schemeClr val="accent4"/>
+          </a:fillRef>
+          <a:effectRef idx="1">
+            <a:schemeClr val="accent4"/>
+          </a:effectRef>
+          <a:fontRef idx="minor">
+            <a:schemeClr val="dk1"/>
+          </a:fontRef>
+        </p:style>
+        <p:txBody>
+          <a:bodyPr wrap="square" rtlCol="0" anchor="ctr">
+            <a:noAutofit/>
+          </a:bodyPr>
+          <a:lstStyle/>
+          <a:p>
+            <a:pPr marL="0" marR="0" lvl="0" indent="0" defTabSz="914400" eaLnBrk="1" fontAlgn="auto" latinLnBrk="0" hangingPunct="1">
+              <a:lnSpc>
+                <a:spcPct val="100000"/>
+              </a:lnSpc>
+              <a:spcBef>
+                <a:spcPts val="0"/>
+              </a:spcBef>
+              <a:spcAft>
+                <a:spcPts val="0"/>
+              </a:spcAft>
+              <a:buClrTx/>
+              <a:buSzTx/>
+              <a:buFontTx/>
+              <a:buNone/>
+              <a:tabLst/>
+              <a:defRPr/>
+            </a:pPr>
+            <a:r>
+              <a:rPr kumimoji="0" lang="en-US" sz="2200" b="0" i="0" u="none" strike="noStrike" kern="0" cap="none" spc="0" normalizeH="0" baseline="0" noProof="0" dirty="0" smtClean="0">
+                <a:ln>
+                  <a:noFill/>
+                </a:ln>
+                <a:solidFill>
+                  <a:sysClr val="windowText" lastClr="000000"/>
+                </a:solidFill>
+                <a:effectLst/>
+                <a:uLnTx/>
+                <a:uFillTx/>
+                <a:latin typeface="Calibri" pitchFamily="34" charset="0"/>
+              </a:rPr>
+              <a:t>train()</a:t>
+            </a:r>
+          </a:p>
+          <a:p>
+            <a:pPr marL="0" marR="0" lvl="0" indent="0" defTabSz="914400" eaLnBrk="1" fontAlgn="auto" latinLnBrk="0" hangingPunct="1">
+              <a:lnSpc>
+                <a:spcPct val="100000"/>
+              </a:lnSpc>
+              <a:spcBef>
+                <a:spcPts val="0"/>
+              </a:spcBef>
+              <a:spcAft>
+                <a:spcPts val="0"/>
+              </a:spcAft>
+              <a:buClrTx/>
+              <a:buSzTx/>
+              <a:buFontTx/>
+              <a:buNone/>
+              <a:tabLst/>
+              <a:defRPr/>
+            </a:pPr>
+            <a:r>
+              <a:rPr lang="en-US" sz="2200" kern="0" dirty="0" smtClean="0">
+                <a:solidFill>
+                  <a:sysClr val="windowText" lastClr="000000"/>
+                </a:solidFill>
+                <a:latin typeface="Calibri" pitchFamily="34" charset="0"/>
+              </a:rPr>
+              <a:t>challenge()</a:t>
+            </a:r>
+            <a:endParaRPr kumimoji="0" lang="en-US" sz="2200" b="0" i="0" u="none" strike="noStrike" kern="0" cap="none" spc="0" normalizeH="0" baseline="0" noProof="0" dirty="0">
+              <a:ln>
+                <a:noFill/>
+              </a:ln>
+              <a:solidFill>
+                <a:sysClr val="windowText" lastClr="000000"/>
+              </a:solidFill>
+              <a:effectLst/>
+              <a:uLnTx/>
+              <a:uFillTx/>
+              <a:latin typeface="Calibri" pitchFamily="34" charset="0"/>
+            </a:endParaRPr>
+          </a:p>
+        </p:txBody>
+      </p:sp>
+      <p:sp>
+        <p:nvSpPr>
+          <p:cNvPr id="41" name="Rectangle 19"/>
+          <p:cNvSpPr/>
+          <p:nvPr/>
+        </p:nvSpPr>
+        <p:spPr>
+          <a:xfrm>
+            <a:off x="5303678" y="4881699"/>
+            <a:ext cx="1500572" cy="225810"/>
+          </a:xfrm>
+          <a:prstGeom prst="rect">
+            <a:avLst/>
+          </a:prstGeom>
+          <a:ln/>
+        </p:spPr>
+        <p:style>
+          <a:lnRef idx="1">
+            <a:schemeClr val="accent2"/>
+          </a:lnRef>
+          <a:fillRef idx="2">
+            <a:schemeClr val="accent2"/>
+          </a:fillRef>
+          <a:effectRef idx="1">
+            <a:schemeClr val="accent2"/>
+          </a:effectRef>
+          <a:fontRef idx="minor">
+            <a:schemeClr val="dk1"/>
+          </a:fontRef>
+        </p:style>
+        <p:txBody>
+          <a:bodyPr wrap="square" rtlCol="0" anchor="ctr">
+            <a:noAutofit/>
+          </a:bodyPr>
+          <a:lstStyle/>
+          <a:p>
+            <a:pPr marL="0" marR="0" lvl="0" indent="0" algn="ctr" defTabSz="914400" eaLnBrk="1" fontAlgn="auto" latinLnBrk="0" hangingPunct="1">
+              <a:lnSpc>
+                <a:spcPct val="100000"/>
+              </a:lnSpc>
+              <a:spcBef>
+                <a:spcPts val="0"/>
+              </a:spcBef>
+              <a:spcAft>
+                <a:spcPts val="0"/>
+              </a:spcAft>
+              <a:buClrTx/>
+              <a:buSzTx/>
+              <a:buFontTx/>
+              <a:buNone/>
+              <a:tabLst/>
+              <a:defRPr/>
+            </a:pPr>
+            <a:endParaRPr kumimoji="0" lang="en-US" sz="2200" b="0" i="0" u="none" strike="noStrike" kern="0" cap="none" spc="0" normalizeH="0" baseline="0" noProof="0" dirty="0">
+              <a:ln>
+                <a:noFill/>
+              </a:ln>
+              <a:solidFill>
+                <a:sysClr val="windowText" lastClr="000000"/>
+              </a:solidFill>
+              <a:effectLst/>
+              <a:uLnTx/>
+              <a:uFillTx/>
+              <a:latin typeface="Calibri" pitchFamily="34" charset="0"/>
+            </a:endParaRPr>
+          </a:p>
+        </p:txBody>
+      </p:sp>
+      <p:sp>
+        <p:nvSpPr>
+          <p:cNvPr id="42" name="Rectangle 20"/>
+          <p:cNvSpPr/>
+          <p:nvPr/>
+        </p:nvSpPr>
+        <p:spPr>
+          <a:xfrm>
+            <a:off x="5303679" y="4994604"/>
+            <a:ext cx="1500570" cy="447039"/>
+          </a:xfrm>
+          <a:prstGeom prst="rect">
+            <a:avLst/>
+          </a:prstGeom>
+          <a:ln/>
+        </p:spPr>
+        <p:style>
+          <a:lnRef idx="1">
+            <a:schemeClr val="accent2"/>
+          </a:lnRef>
+          <a:fillRef idx="2">
+            <a:schemeClr val="accent2"/>
+          </a:fillRef>
+          <a:effectRef idx="1">
+            <a:schemeClr val="accent2"/>
+          </a:effectRef>
+          <a:fontRef idx="minor">
+            <a:schemeClr val="dk1"/>
+          </a:fontRef>
+        </p:style>
+        <p:txBody>
+          <a:bodyPr wrap="square" rtlCol="0" anchor="ctr">
+            <a:noAutofit/>
+          </a:bodyPr>
+          <a:lstStyle/>
+          <a:p>
+            <a:pPr marL="0" marR="0" lvl="0" indent="0" defTabSz="914400" eaLnBrk="1" fontAlgn="auto" latinLnBrk="0" hangingPunct="1">
+              <a:lnSpc>
+                <a:spcPct val="100000"/>
+              </a:lnSpc>
+              <a:spcBef>
+                <a:spcPts val="0"/>
+              </a:spcBef>
+              <a:spcAft>
+                <a:spcPts val="0"/>
+              </a:spcAft>
+              <a:buClrTx/>
+              <a:buSzTx/>
+              <a:buFontTx/>
+              <a:buNone/>
+              <a:tabLst/>
+              <a:defRPr/>
+            </a:pPr>
+            <a:r>
+              <a:rPr lang="en-US" sz="2200" kern="0" dirty="0" smtClean="0">
+                <a:solidFill>
+                  <a:sysClr val="windowText" lastClr="000000"/>
+                </a:solidFill>
+                <a:latin typeface="Calibri" pitchFamily="34" charset="0"/>
+              </a:rPr>
+              <a:t>challenge()</a:t>
+            </a:r>
+            <a:endParaRPr kumimoji="0" lang="en-US" sz="2200" b="0" i="0" u="none" strike="noStrike" kern="0" cap="none" spc="0" normalizeH="0" baseline="0" noProof="0" dirty="0">
+              <a:ln>
+                <a:noFill/>
+              </a:ln>
+              <a:solidFill>
+                <a:sysClr val="windowText" lastClr="000000"/>
+              </a:solidFill>
+              <a:effectLst/>
+              <a:uLnTx/>
+              <a:uFillTx/>
+              <a:latin typeface="Calibri" pitchFamily="34" charset="0"/>
             </a:endParaRPr>
           </a:p>
         </p:txBody>
@@ -8098,6 +9294,114 @@
                                   </p:childTnLst>
                                 </p:cTn>
                               </p:par>
+                              <p:par>
+                                <p:cTn id="33" presetID="1" presetClass="entr" presetSubtype="0" fill="hold" grpId="0" nodeType="withEffect">
+                                  <p:stCondLst>
+                                    <p:cond delay="0"/>
+                                  </p:stCondLst>
+                                  <p:childTnLst>
+                                    <p:set>
+                                      <p:cBhvr>
+                                        <p:cTn id="34" dur="1" fill="hold">
+                                          <p:stCondLst>
+                                            <p:cond delay="0"/>
+                                          </p:stCondLst>
+                                        </p:cTn>
+                                        <p:tgtEl>
+                                          <p:spTgt spid="37"/>
+                                        </p:tgtEl>
+                                        <p:attrNameLst>
+                                          <p:attrName>style.visibility</p:attrName>
+                                        </p:attrNameLst>
+                                      </p:cBhvr>
+                                      <p:to>
+                                        <p:strVal val="visible"/>
+                                      </p:to>
+                                    </p:set>
+                                  </p:childTnLst>
+                                </p:cTn>
+                              </p:par>
+                              <p:par>
+                                <p:cTn id="35" presetID="1" presetClass="entr" presetSubtype="0" fill="hold" grpId="0" nodeType="withEffect">
+                                  <p:stCondLst>
+                                    <p:cond delay="0"/>
+                                  </p:stCondLst>
+                                  <p:childTnLst>
+                                    <p:set>
+                                      <p:cBhvr>
+                                        <p:cTn id="36" dur="1" fill="hold">
+                                          <p:stCondLst>
+                                            <p:cond delay="0"/>
+                                          </p:stCondLst>
+                                        </p:cTn>
+                                        <p:tgtEl>
+                                          <p:spTgt spid="38"/>
+                                        </p:tgtEl>
+                                        <p:attrNameLst>
+                                          <p:attrName>style.visibility</p:attrName>
+                                        </p:attrNameLst>
+                                      </p:cBhvr>
+                                      <p:to>
+                                        <p:strVal val="visible"/>
+                                      </p:to>
+                                    </p:set>
+                                  </p:childTnLst>
+                                </p:cTn>
+                              </p:par>
+                              <p:par>
+                                <p:cTn id="37" presetID="1" presetClass="entr" presetSubtype="0" fill="hold" grpId="0" nodeType="withEffect">
+                                  <p:stCondLst>
+                                    <p:cond delay="0"/>
+                                  </p:stCondLst>
+                                  <p:childTnLst>
+                                    <p:set>
+                                      <p:cBhvr>
+                                        <p:cTn id="38" dur="1" fill="hold">
+                                          <p:stCondLst>
+                                            <p:cond delay="0"/>
+                                          </p:stCondLst>
+                                        </p:cTn>
+                                        <p:tgtEl>
+                                          <p:spTgt spid="41"/>
+                                        </p:tgtEl>
+                                        <p:attrNameLst>
+                                          <p:attrName>style.visibility</p:attrName>
+                                        </p:attrNameLst>
+                                      </p:cBhvr>
+                                      <p:to>
+                                        <p:strVal val="visible"/>
+                                      </p:to>
+                                    </p:set>
+                                  </p:childTnLst>
+                                </p:cTn>
+                              </p:par>
+                              <p:par>
+                                <p:cTn id="39" presetID="1" presetClass="entr" presetSubtype="0" fill="hold" grpId="0" nodeType="withEffect">
+                                  <p:stCondLst>
+                                    <p:cond delay="0"/>
+                                  </p:stCondLst>
+                                  <p:childTnLst>
+                                    <p:set>
+                                      <p:cBhvr>
+                                        <p:cTn id="40" dur="1" fill="hold">
+                                          <p:stCondLst>
+                                            <p:cond delay="0"/>
+                                          </p:stCondLst>
+                                        </p:cTn>
+                                        <p:tgtEl>
+                                          <p:spTgt spid="42"/>
+                                        </p:tgtEl>
+                                        <p:attrNameLst>
+                                          <p:attrName>style.visibility</p:attrName>
+                                        </p:attrNameLst>
+                                      </p:cBhvr>
+                                      <p:to>
+                                        <p:strVal val="visible"/>
+                                      </p:to>
+                                    </p:set>
+                                  </p:childTnLst>
+                                </p:cTn>
+                              </p:par>
                             </p:childTnLst>
                           </p:cTn>
                         </p:par>
@@ -8134,6 +9438,10 @@
       <p:bldP spid="29" grpId="0" animBg="1"/>
       <p:bldP spid="31" grpId="0" animBg="1"/>
       <p:bldP spid="45" grpId="0" animBg="1"/>
+      <p:bldP spid="37" grpId="0" animBg="1"/>
+      <p:bldP spid="38" grpId="0" animBg="1"/>
+      <p:bldP spid="41" grpId="0" animBg="1"/>
+      <p:bldP spid="42" grpId="0" animBg="1"/>
     </p:bldLst>
   </p:timing>
 </p:sld>

</xml_diff>